<commit_message>
fixed goal precal ppt
</commit_message>
<xml_diff>
--- a/print/Precal_14_2.pptx
+++ b/print/Precal_14_2.pptx
@@ -526,15 +526,6 @@
           <a:lstStyle/>
           <a:p>
             <a:pPr/>
-            <a:r>
-              <a:t>VOCAB: </a:t>
-            </a:r>
-          </a:p>
-          <a:p>
-            <a:pPr/>
-            <a:r>
-              <a:t>nested loop</a:t>
-            </a:r>
           </a:p>
         </p:txBody>
       </p:sp>
@@ -565,7 +556,7 @@
       </p:grpSpPr>
       <p:sp>
         <p:nvSpPr>
-          <p:cNvPr id="202" name="Shape 202"/>
+          <p:cNvPr id="193" name="Shape 193"/>
           <p:cNvSpPr/>
           <p:nvPr>
             <p:ph type="sldImg"/>
@@ -586,7 +577,7 @@
       </p:sp>
       <p:sp>
         <p:nvSpPr>
-          <p:cNvPr id="203" name="Shape 203"/>
+          <p:cNvPr id="194" name="Shape 194"/>
           <p:cNvSpPr/>
           <p:nvPr>
             <p:ph type="body" sz="quarter" idx="1"/>
@@ -605,23 +596,17 @@
               <a:buSzPct val="100000"/>
               <a:buAutoNum type="arabicPeriod" startAt="1"/>
             </a:pPr>
-          </a:p>
-          <a:p>
-            <a:pPr marL="233947" indent="-233947">
+            <a:r>
+              <a:t>piecewise function</a:t>
+            </a:r>
+          </a:p>
+          <a:p>
+            <a:pPr marL="187157" indent="-187157">
               <a:buSzPct val="100000"/>
-              <a:buAutoNum type="alphaUcPeriod" startAt="1"/>
+              <a:buAutoNum type="arabicPeriod" startAt="1"/>
             </a:pPr>
             <a:r>
-              <a:t>Contains the same   is-safe-left(), is-safe-right() and is-onscreen()  Functions,</a:t>
-            </a:r>
-          </a:p>
-          <a:p>
-            <a:pPr marL="233947" indent="-233947">
-              <a:buSzPct val="100000"/>
-              <a:buAutoNum type="alphaUcPeriod" startAt="1"/>
-            </a:pPr>
-            <a:r>
-              <a:t>They’re just leaving the screen we want them to bounce back </a:t>
+              <a:t>p(-2) = 6, p(-1) = 5, p(0) = -1.  </a:t>
             </a:r>
           </a:p>
         </p:txBody>
@@ -653,7 +638,7 @@
       </p:grpSpPr>
       <p:sp>
         <p:nvSpPr>
-          <p:cNvPr id="208" name="Shape 208"/>
+          <p:cNvPr id="204" name="Shape 204"/>
           <p:cNvSpPr/>
           <p:nvPr>
             <p:ph type="sldImg"/>
@@ -674,7 +659,7 @@
       </p:sp>
       <p:sp>
         <p:nvSpPr>
-          <p:cNvPr id="209" name="Shape 209"/>
+          <p:cNvPr id="205" name="Shape 205"/>
           <p:cNvSpPr/>
           <p:nvPr>
             <p:ph type="body" sz="quarter" idx="1"/>
@@ -741,7 +726,7 @@
       </p:grpSpPr>
       <p:sp>
         <p:nvSpPr>
-          <p:cNvPr id="214" name="Shape 214"/>
+          <p:cNvPr id="210" name="Shape 210"/>
           <p:cNvSpPr/>
           <p:nvPr>
             <p:ph type="sldImg"/>
@@ -762,7 +747,7 @@
       </p:sp>
       <p:sp>
         <p:nvSpPr>
-          <p:cNvPr id="215" name="Shape 215"/>
+          <p:cNvPr id="211" name="Shape 211"/>
           <p:cNvSpPr/>
           <p:nvPr>
             <p:ph type="body" sz="quarter" idx="1"/>
@@ -777,12 +762,187 @@
           <a:bodyPr/>
           <a:lstStyle/>
           <a:p>
+            <a:pPr/>
+            <a:r>
+              <a:t>fun p(x):</a:t>
+            </a:r>
+          </a:p>
+          <a:p>
+            <a:pPr/>
+            <a:r>
+              <a:t>  ask:</a:t>
+            </a:r>
+          </a:p>
+          <a:p>
+            <a:pPr/>
+            <a:r>
+              <a:t>    | x &lt; -2 then: num-sqr(x) + 2</a:t>
+            </a:r>
+          </a:p>
+          <a:p>
+            <a:pPr/>
+            <a:r>
+              <a:t>    | x == -1 then: 5</a:t>
+            </a:r>
+          </a:p>
+          <a:p>
+            <a:pPr/>
+            <a:r>
+              <a:t>    | x &gt; -1 then: x -1</a:t>
+            </a:r>
+          </a:p>
+          <a:p>
+            <a:pPr/>
+            <a:r>
+              <a:t>  end </a:t>
+            </a:r>
+          </a:p>
+          <a:p>
+            <a:pPr/>
+            <a:r>
+              <a:t>end</a:t>
+            </a:r>
+          </a:p>
+          <a:p>
+            <a:pPr/>
+          </a:p>
+          <a:p>
+            <a:pPr/>
+            <a:r>
+              <a:t>fun cost(item):</a:t>
+            </a:r>
+          </a:p>
+          <a:p>
+            <a:pPr/>
+            <a:r>
+              <a:t>  ask:</a:t>
+            </a:r>
+          </a:p>
+          <a:p>
+            <a:pPr/>
+            <a:r>
+              <a:t>    | item == "hamburger"   then: image-url(..)</a:t>
+            </a:r>
+          </a:p>
+          <a:p>
+            <a:pPr/>
+            <a:r>
+              <a:t>    | item == "onion rings" then:  image-url(..)</a:t>
+            </a:r>
+          </a:p>
+          <a:p>
+            <a:pPr/>
+          </a:p>
+          <a:p>
+            <a:pPr/>
+            <a:r>
+              <a:t>    | item == "fried tofu"  then:  image-url(..)</a:t>
+            </a:r>
+          </a:p>
+          <a:p>
+            <a:pPr/>
+          </a:p>
+          <a:p>
+            <a:pPr/>
+            <a:r>
+              <a:t>    | item == "pie"         then:  image-url(..)</a:t>
+            </a:r>
+          </a:p>
+          <a:p>
+            <a:pPr/>
+          </a:p>
+          <a:p>
+            <a:pPr/>
+            <a:r>
+              <a:t>    | otherwise: "That's not on the menu!"</a:t>
+            </a:r>
+          </a:p>
+          <a:p>
+            <a:pPr/>
+            <a:r>
+              <a:t>  end</a:t>
+            </a:r>
+          </a:p>
+          <a:p>
+            <a:pPr/>
+            <a:r>
+              <a:t>end</a:t>
+            </a:r>
+          </a:p>
+          <a:p>
+            <a:pPr/>
+          </a:p>
+        </p:txBody>
+      </p:sp>
+    </p:spTree>
+  </p:cSld>
+  <p:clrMapOvr>
+    <a:masterClrMapping/>
+  </p:clrMapOvr>
+</p:notes>
+</file>
+
+<file path=ppt/notesSlides/notesSlide5.xml><?xml version="1.0" encoding="utf-8"?>
+<p:notes xmlns:a="http://schemas.openxmlformats.org/drawingml/2006/main" xmlns:r="http://schemas.openxmlformats.org/officeDocument/2006/relationships" xmlns:p="http://schemas.openxmlformats.org/presentationml/2006/main" xmlns:m="http://schemas.openxmlformats.org/officeDocument/2006/math" xmlns:a14="http://schemas.microsoft.com/office/drawing/2010/main" showMasterSp="1" showMasterPhAnim="1">
+  <p:cSld>
+    <p:spTree>
+      <p:nvGrpSpPr>
+        <p:cNvPr id="1" name=""/>
+        <p:cNvGrpSpPr/>
+        <p:nvPr/>
+      </p:nvGrpSpPr>
+      <p:grpSpPr>
+        <a:xfrm>
+          <a:off x="0" y="0"/>
+          <a:ext cx="0" cy="0"/>
+          <a:chOff x="0" y="0"/>
+          <a:chExt cx="0" cy="0"/>
+        </a:xfrm>
+      </p:grpSpPr>
+      <p:sp>
+        <p:nvSpPr>
+          <p:cNvPr id="216" name="Shape 216"/>
+          <p:cNvSpPr/>
+          <p:nvPr>
+            <p:ph type="sldImg"/>
+          </p:nvPr>
+        </p:nvSpPr>
+        <p:spPr>
+          <a:prstGeom prst="rect">
+            <a:avLst/>
+          </a:prstGeom>
+        </p:spPr>
+        <p:txBody>
+          <a:bodyPr/>
+          <a:lstStyle/>
+          <a:p>
+            <a:pPr/>
+          </a:p>
+        </p:txBody>
+      </p:sp>
+      <p:sp>
+        <p:nvSpPr>
+          <p:cNvPr id="217" name="Shape 217"/>
+          <p:cNvSpPr/>
+          <p:nvPr>
+            <p:ph type="body" sz="quarter" idx="1"/>
+          </p:nvPr>
+        </p:nvSpPr>
+        <p:spPr>
+          <a:prstGeom prst="rect">
+            <a:avLst/>
+          </a:prstGeom>
+        </p:spPr>
+        <p:txBody>
+          <a:bodyPr/>
+          <a:lstStyle/>
+          <a:p>
             <a:pPr marL="187157" indent="-187157">
               <a:buSzPct val="100000"/>
               <a:buAutoNum type="arabicPeriod" startAt="1"/>
             </a:pPr>
             <a:r>
-              <a:t>answers will vary.</a:t>
+              <a:t>answers will vary</a:t>
             </a:r>
           </a:p>
           <a:p>
@@ -791,7 +951,7 @@
               <a:buAutoNum type="arabicPeriod" startAt="1"/>
             </a:pPr>
             <a:r>
-              <a:t>using functions for manipulating images, e.g. scale(), overlay, etc. </a:t>
+              <a:t>“”</a:t>
             </a:r>
           </a:p>
         </p:txBody>
@@ -2891,7 +3051,7 @@
             </a:r>
             <a:r>
               <a:rPr b="0"/>
-              <a:t>HDW use inequalities in Pyret to keep your character on screen?</a:t>
+              <a:t>HDW implement piecewise functions in Pyret?</a:t>
             </a:r>
           </a:p>
         </p:txBody>
@@ -5670,7 +5830,7 @@
           <p:nvPr/>
         </p:nvPicPr>
         <p:blipFill>
-          <a:blip r:embed="rId2">
+          <a:blip r:embed="rId3">
             <a:extLst/>
           </a:blip>
           <a:stretch>
@@ -5795,7 +5955,7 @@
       </p:grpSpPr>
       <p:sp>
         <p:nvSpPr>
-          <p:cNvPr id="194" name="Google Shape;118;p19"/>
+          <p:cNvPr id="196" name="Google Shape;118;p19"/>
           <p:cNvSpPr txBox="1"/>
           <p:nvPr>
             <p:ph type="title"/>
@@ -5844,7 +6004,7 @@
       </p:sp>
       <p:sp>
         <p:nvSpPr>
-          <p:cNvPr id="195" name="Welcome to our new room, B24!  Please read the information below:…"/>
+          <p:cNvPr id="197" name="Welcome to our new room, B24!  Please read the information below:…"/>
           <p:cNvSpPr txBox="1"/>
           <p:nvPr/>
         </p:nvSpPr>
@@ -6050,7 +6210,7 @@
                                       <p:cBhvr>
                                         <p:cTn id="6" fill="hold"/>
                                         <p:tgtEl>
-                                          <p:spTgt spid="195"/>
+                                          <p:spTgt spid="197"/>
                                         </p:tgtEl>
                                         <p:attrNameLst>
                                           <p:attrName>style.visibility</p:attrName>
@@ -6091,7 +6251,7 @@
       </p:par>
     </p:tnLst>
     <p:bldLst>
-      <p:bldP build="whole" bldLvl="1" animBg="1" rev="0" advAuto="0" spid="195" grpId="1"/>
+      <p:bldP build="whole" bldLvl="1" animBg="1" rev="0" advAuto="0" spid="197" grpId="1"/>
     </p:bldLst>
   </p:timing>
 </p:sld>
@@ -6116,7 +6276,7 @@
       </p:grpSpPr>
       <p:sp>
         <p:nvSpPr>
-          <p:cNvPr id="197" name="framing…"/>
+          <p:cNvPr id="199" name="framing…"/>
           <p:cNvSpPr txBox="1"/>
           <p:nvPr/>
         </p:nvSpPr>
@@ -6189,7 +6349,7 @@
             </a:r>
             <a:r>
               <a:rPr b="0"/>
-              <a:t> use inequalities in Pyret to keep your character on screen</a:t>
+              <a:t> implement piecewise functions in Pyret move around but not too far!</a:t>
             </a:r>
             <a:endParaRPr b="0"/>
           </a:p>
@@ -6215,36 +6375,6 @@
               </a:defRPr>
             </a:pPr>
             <a:r>
-              <a:t>why: </a:t>
-            </a:r>
-            <a:r>
-              <a:rPr b="0"/>
-              <a:t>we want our images to move around but not too far!</a:t>
-            </a:r>
-            <a:endParaRPr b="0"/>
-          </a:p>
-          <a:p>
-            <a:pPr marL="457200" indent="-342900">
-              <a:lnSpc>
-                <a:spcPct val="115000"/>
-              </a:lnSpc>
-              <a:buClr>
-                <a:srgbClr val="000000"/>
-              </a:buClr>
-              <a:buSzPts val="1800"/>
-              <a:buFont typeface="Helvetica"/>
-              <a:buChar char="●"/>
-              <a:defRPr b="1" sz="1800">
-                <a:solidFill>
-                  <a:srgbClr val="000000"/>
-                </a:solidFill>
-                <a:latin typeface="Lato"/>
-                <a:ea typeface="Lato"/>
-                <a:cs typeface="Lato"/>
-                <a:sym typeface="Lato"/>
-              </a:defRPr>
-            </a:pPr>
-            <a:r>
               <a:t>where to: </a:t>
             </a:r>
             <a:r>
@@ -6256,7 +6386,7 @@
       </p:sp>
       <p:pic>
         <p:nvPicPr>
-          <p:cNvPr id="198" name="Image" descr="Image"/>
+          <p:cNvPr id="200" name="Image" descr="Image"/>
           <p:cNvPicPr>
             <a:picLocks noChangeAspect="1"/>
           </p:cNvPicPr>
@@ -6322,7 +6452,7 @@
                                       <p:cBhvr>
                                         <p:cTn id="6" fill="hold"/>
                                         <p:tgtEl>
-                                          <p:spTgt spid="197">
+                                          <p:spTgt spid="199">
                                             <p:bg/>
                                           </p:spTgt>
                                         </p:tgtEl>
@@ -6350,7 +6480,7 @@
                                       <p:cBhvr>
                                         <p:cTn id="8" fill="hold"/>
                                         <p:tgtEl>
-                                          <p:spTgt spid="197">
+                                          <p:spTgt spid="199">
                                             <p:txEl>
                                               <p:pRg st="0" end="0"/>
                                             </p:txEl>
@@ -6398,7 +6528,7 @@
                                       <p:cBhvr>
                                         <p:cTn id="12" fill="hold"/>
                                         <p:tgtEl>
-                                          <p:spTgt spid="197">
+                                          <p:spTgt spid="199">
                                             <p:txEl>
                                               <p:pRg st="1" end="1"/>
                                             </p:txEl>
@@ -6446,7 +6576,770 @@
                                       <p:cBhvr>
                                         <p:cTn id="16" fill="hold"/>
                                         <p:tgtEl>
-                                          <p:spTgt spid="197">
+                                          <p:spTgt spid="199">
+                                            <p:txEl>
+                                              <p:pRg st="2" end="2"/>
+                                            </p:txEl>
+                                          </p:spTgt>
+                                        </p:tgtEl>
+                                        <p:attrNameLst>
+                                          <p:attrName>style.visibility</p:attrName>
+                                        </p:attrNameLst>
+                                      </p:cBhvr>
+                                      <p:to>
+                                        <p:strVal val="visible"/>
+                                      </p:to>
+                                    </p:set>
+                                  </p:childTnLst>
+                                </p:cTn>
+                              </p:par>
+                            </p:childTnLst>
+                          </p:cTn>
+                        </p:par>
+                      </p:childTnLst>
+                    </p:cTn>
+                  </p:par>
+                </p:childTnLst>
+              </p:cTn>
+              <p:prevCondLst>
+                <p:cond evt="onPrev">
+                  <p:tgtEl>
+                    <p:sldTgt/>
+                  </p:tgtEl>
+                </p:cond>
+              </p:prevCondLst>
+              <p:nextCondLst>
+                <p:cond evt="onNext">
+                  <p:tgtEl>
+                    <p:sldTgt/>
+                  </p:tgtEl>
+                </p:cond>
+              </p:nextCondLst>
+            </p:seq>
+          </p:childTnLst>
+        </p:cTn>
+      </p:par>
+    </p:tnLst>
+    <p:bldLst>
+      <p:bldP build="p" bldLvl="5" animBg="1" rev="0" advAuto="0" spid="199" grpId="1"/>
+    </p:bldLst>
+  </p:timing>
+</p:sld>
+</file>
+
+<file path=ppt/slides/slide5.xml><?xml version="1.0" encoding="utf-8"?>
+<p:sld xmlns:a="http://schemas.openxmlformats.org/drawingml/2006/main" xmlns:r="http://schemas.openxmlformats.org/officeDocument/2006/relationships" xmlns:p="http://schemas.openxmlformats.org/presentationml/2006/main" xmlns:m="http://schemas.openxmlformats.org/officeDocument/2006/math" xmlns:a14="http://schemas.microsoft.com/office/drawing/2010/main" showMasterSp="1" showMasterPhAnim="1">
+  <p:cSld>
+    <p:spTree>
+      <p:nvGrpSpPr>
+        <p:cNvPr id="1" name=""/>
+        <p:cNvGrpSpPr/>
+        <p:nvPr/>
+      </p:nvGrpSpPr>
+      <p:grpSpPr>
+        <a:xfrm>
+          <a:off x="0" y="0"/>
+          <a:ext cx="0" cy="0"/>
+          <a:chOff x="0" y="0"/>
+          <a:chExt cx="0" cy="0"/>
+        </a:xfrm>
+      </p:grpSpPr>
+      <p:sp>
+        <p:nvSpPr>
+          <p:cNvPr id="202" name="Coding to learn: warm up"/>
+          <p:cNvSpPr txBox="1"/>
+          <p:nvPr/>
+        </p:nvSpPr>
+        <p:spPr>
+          <a:xfrm>
+            <a:off x="2241183" y="488242"/>
+            <a:ext cx="4266992" cy="381001"/>
+          </a:xfrm>
+          <a:prstGeom prst="rect">
+            <a:avLst/>
+          </a:prstGeom>
+          <a:ln w="12700">
+            <a:solidFill>
+              <a:srgbClr val="012F7B"/>
+            </a:solidFill>
+            <a:miter lim="400000"/>
+          </a:ln>
+          <a:extLst>
+            <a:ext uri="{C572A759-6A51-4108-AA02-DFA0A04FC94B}">
+              <ma14:wrappingTextBoxFlag xmlns:ma14="http://schemas.microsoft.com/office/mac/drawingml/2011/main" val="1"/>
+            </a:ext>
+          </a:extLst>
+        </p:spPr>
+        <p:txBody>
+          <a:bodyPr lIns="0" tIns="0" rIns="0" bIns="0">
+            <a:spAutoFit/>
+          </a:bodyPr>
+          <a:lstStyle>
+            <a:lvl1pPr>
+              <a:defRPr sz="2400"/>
+            </a:lvl1pPr>
+          </a:lstStyle>
+          <a:p>
+            <a:pPr/>
+            <a:r>
+              <a:t>Coding to learn: warm up</a:t>
+            </a:r>
+          </a:p>
+        </p:txBody>
+      </p:sp>
+      <p:sp>
+        <p:nvSpPr>
+          <p:cNvPr id="203" name="be sure to: take a seat at your computer, next to your partner.  Keep your binder out. Open the Alice’s Restaurant Starter File on Google Classroom.  Save a copy.  Answer the questions below in your notes.:…"/>
+          <p:cNvSpPr txBox="1"/>
+          <p:nvPr/>
+        </p:nvSpPr>
+        <p:spPr>
+          <a:xfrm>
+            <a:off x="1417029" y="1236753"/>
+            <a:ext cx="5044704" cy="2159001"/>
+          </a:xfrm>
+          <a:prstGeom prst="rect">
+            <a:avLst/>
+          </a:prstGeom>
+          <a:ln w="12700">
+            <a:miter lim="400000"/>
+          </a:ln>
+          <a:extLst>
+            <a:ext uri="{C572A759-6A51-4108-AA02-DFA0A04FC94B}">
+              <ma14:wrappingTextBoxFlag xmlns:ma14="http://schemas.microsoft.com/office/mac/drawingml/2011/main" val="1"/>
+            </a:ext>
+          </a:extLst>
+        </p:spPr>
+        <p:txBody>
+          <a:bodyPr lIns="0" tIns="0" rIns="0" bIns="0">
+            <a:spAutoFit/>
+          </a:bodyPr>
+          <a:lstStyle/>
+          <a:p>
+            <a:pPr>
+              <a:defRPr>
+                <a:solidFill>
+                  <a:srgbClr val="011D57"/>
+                </a:solidFill>
+              </a:defRPr>
+            </a:pPr>
+            <a:r>
+              <a:rPr>
+                <a:solidFill>
+                  <a:srgbClr val="FFAB01"/>
+                </a:solidFill>
+              </a:rPr>
+              <a:t>be sure to</a:t>
+            </a:r>
+            <a:r>
+              <a:t>:</a:t>
+            </a:r>
+            <a:r>
+              <a:rPr>
+                <a:solidFill>
+                  <a:schemeClr val="accent5">
+                    <a:lumOff val="-9843"/>
+                  </a:schemeClr>
+                </a:solidFill>
+              </a:rPr>
+              <a:t> </a:t>
+            </a:r>
+            <a:r>
+              <a:rPr>
+                <a:solidFill>
+                  <a:srgbClr val="11053B"/>
+                </a:solidFill>
+              </a:rPr>
+              <a:t>take a seat at your computer, next to your partner.  Keep your </a:t>
+            </a:r>
+            <a:r>
+              <a:rPr b="1">
+                <a:solidFill>
+                  <a:srgbClr val="11053B"/>
+                </a:solidFill>
+              </a:rPr>
+              <a:t>binder </a:t>
+            </a:r>
+            <a:r>
+              <a:rPr>
+                <a:solidFill>
+                  <a:srgbClr val="11053B"/>
+                </a:solidFill>
+              </a:rPr>
+              <a:t>out</a:t>
+            </a:r>
+            <a:r>
+              <a:rPr>
+                <a:solidFill>
+                  <a:srgbClr val="11053B"/>
+                </a:solidFill>
+              </a:rPr>
+              <a:t>.</a:t>
+            </a:r>
+            <a:r>
+              <a:rPr>
+                <a:solidFill>
+                  <a:schemeClr val="accent3">
+                    <a:lumOff val="-9098"/>
+                  </a:schemeClr>
+                </a:solidFill>
+              </a:rPr>
+              <a:t> </a:t>
+            </a:r>
+            <a:r>
+              <a:t>Open the </a:t>
+            </a:r>
+            <a:r>
+              <a:rPr>
+                <a:solidFill>
+                  <a:srgbClr val="E22400"/>
+                </a:solidFill>
+              </a:rPr>
+              <a:t>Alice’s Restaurant Starter File</a:t>
+            </a:r>
+            <a:r>
+              <a:t> on </a:t>
+            </a:r>
+            <a:r>
+              <a:rPr>
+                <a:solidFill>
+                  <a:srgbClr val="FF6A00"/>
+                </a:solidFill>
+              </a:rPr>
+              <a:t>Google Classroom</a:t>
+            </a:r>
+            <a:r>
+              <a:t>.  Save a copy.  Answer the questions below in your notes.:</a:t>
+            </a:r>
+          </a:p>
+          <a:p>
+            <a:pPr>
+              <a:defRPr>
+                <a:solidFill>
+                  <a:srgbClr val="011D57"/>
+                </a:solidFill>
+              </a:defRPr>
+            </a:pPr>
+          </a:p>
+          <a:p>
+            <a:pPr marL="187157" indent="-187157">
+              <a:buSzPct val="100000"/>
+              <a:buAutoNum type="arabicPeriod" startAt="1"/>
+              <a:defRPr>
+                <a:solidFill>
+                  <a:srgbClr val="011D57"/>
+                </a:solidFill>
+              </a:defRPr>
+            </a:pPr>
+            <a:r>
+              <a:t>Describe what you notice about this program.</a:t>
+            </a:r>
+          </a:p>
+          <a:p>
+            <a:pPr marL="187157" indent="-187157">
+              <a:buSzPct val="100000"/>
+              <a:buAutoNum type="arabicPeriod" startAt="1"/>
+              <a:defRPr>
+                <a:solidFill>
+                  <a:srgbClr val="011D57"/>
+                </a:solidFill>
+              </a:defRPr>
+            </a:pPr>
+            <a:r>
+              <a:t>What function is being defined here?</a:t>
+            </a:r>
+          </a:p>
+          <a:p>
+            <a:pPr marL="187157" indent="-187157">
+              <a:buSzPct val="100000"/>
+              <a:buAutoNum type="arabicPeriod" startAt="1"/>
+              <a:defRPr>
+                <a:solidFill>
+                  <a:srgbClr val="011D57"/>
+                </a:solidFill>
+              </a:defRPr>
+            </a:pPr>
+            <a:r>
+              <a:t>How does the function work?</a:t>
+            </a:r>
+          </a:p>
+          <a:p>
+            <a:pPr marL="187157" indent="-187157">
+              <a:buSzPct val="100000"/>
+              <a:buAutoNum type="arabicPeriod" startAt="1"/>
+              <a:defRPr>
+                <a:solidFill>
+                  <a:srgbClr val="011D57"/>
+                </a:solidFill>
+              </a:defRPr>
+            </a:pPr>
+            <a:r>
+              <a:t>What happens when we try to order something not on the menu?</a:t>
+            </a:r>
+          </a:p>
+        </p:txBody>
+      </p:sp>
+    </p:spTree>
+  </p:cSld>
+  <p:clrMapOvr>
+    <a:masterClrMapping/>
+  </p:clrMapOvr>
+  <p:transition xmlns:p14="http://schemas.microsoft.com/office/powerpoint/2010/main" spd="med" advClick="1"/>
+  <p:timing>
+    <p:tnLst>
+      <p:par>
+        <p:cTn id="1" nodeType="tmRoot" restart="never" dur="indefinite" fill="hold">
+          <p:childTnLst>
+            <p:seq concurrent="1" prevAc="none" nextAc="seek">
+              <p:cTn id="2" nodeType="mainSeq" dur="indefinite" fill="hold">
+                <p:childTnLst>
+                  <p:par>
+                    <p:cTn id="3" fill="hold">
+                      <p:stCondLst>
+                        <p:cond delay="indefinite"/>
+                      </p:stCondLst>
+                      <p:childTnLst>
+                        <p:par>
+                          <p:cTn id="4" fill="hold">
+                            <p:stCondLst>
+                              <p:cond delay="0"/>
+                            </p:stCondLst>
+                            <p:childTnLst>
+                              <p:par>
+                                <p:cTn id="5" presetClass="entr" nodeType="clickEffect" presetSubtype="0" presetID="1" grpId="1" fill="hold">
+                                  <p:stCondLst>
+                                    <p:cond delay="0"/>
+                                  </p:stCondLst>
+                                  <p:iterate type="el" backwards="0">
+                                    <p:tmAbs val="0"/>
+                                  </p:iterate>
+                                  <p:childTnLst>
+                                    <p:set>
+                                      <p:cBhvr>
+                                        <p:cTn id="6" fill="hold"/>
+                                        <p:tgtEl>
+                                          <p:spTgt spid="203"/>
+                                        </p:tgtEl>
+                                        <p:attrNameLst>
+                                          <p:attrName>style.visibility</p:attrName>
+                                        </p:attrNameLst>
+                                      </p:cBhvr>
+                                      <p:to>
+                                        <p:strVal val="visible"/>
+                                      </p:to>
+                                    </p:set>
+                                  </p:childTnLst>
+                                </p:cTn>
+                              </p:par>
+                            </p:childTnLst>
+                          </p:cTn>
+                        </p:par>
+                      </p:childTnLst>
+                    </p:cTn>
+                  </p:par>
+                </p:childTnLst>
+              </p:cTn>
+              <p:prevCondLst>
+                <p:cond evt="onPrev">
+                  <p:tgtEl>
+                    <p:sldTgt/>
+                  </p:tgtEl>
+                </p:cond>
+              </p:prevCondLst>
+              <p:nextCondLst>
+                <p:cond evt="onNext">
+                  <p:tgtEl>
+                    <p:sldTgt/>
+                  </p:tgtEl>
+                </p:cond>
+              </p:nextCondLst>
+            </p:seq>
+          </p:childTnLst>
+        </p:cTn>
+      </p:par>
+    </p:tnLst>
+    <p:bldLst>
+      <p:bldP build="whole" bldLvl="1" animBg="1" rev="0" advAuto="0" spid="203" grpId="1"/>
+    </p:bldLst>
+  </p:timing>
+</p:sld>
+</file>
+
+<file path=ppt/slides/slide6.xml><?xml version="1.0" encoding="utf-8"?>
+<p:sld xmlns:a="http://schemas.openxmlformats.org/drawingml/2006/main" xmlns:r="http://schemas.openxmlformats.org/officeDocument/2006/relationships" xmlns:p="http://schemas.openxmlformats.org/presentationml/2006/main" xmlns:m="http://schemas.openxmlformats.org/officeDocument/2006/math" xmlns:a14="http://schemas.microsoft.com/office/drawing/2010/main" showMasterSp="1" showMasterPhAnim="1">
+  <p:cSld>
+    <p:spTree>
+      <p:nvGrpSpPr>
+        <p:cNvPr id="1" name=""/>
+        <p:cNvGrpSpPr/>
+        <p:nvPr/>
+      </p:nvGrpSpPr>
+      <p:grpSpPr>
+        <a:xfrm>
+          <a:off x="0" y="0"/>
+          <a:ext cx="0" cy="0"/>
+          <a:chOff x="0" y="0"/>
+          <a:chExt cx="0" cy="0"/>
+        </a:xfrm>
+      </p:grpSpPr>
+      <p:sp>
+        <p:nvSpPr>
+          <p:cNvPr id="207" name="Coding to learn: activity"/>
+          <p:cNvSpPr txBox="1"/>
+          <p:nvPr/>
+        </p:nvSpPr>
+        <p:spPr>
+          <a:xfrm>
+            <a:off x="2241183" y="488242"/>
+            <a:ext cx="3396395" cy="381001"/>
+          </a:xfrm>
+          <a:prstGeom prst="rect">
+            <a:avLst/>
+          </a:prstGeom>
+          <a:ln w="12700">
+            <a:solidFill>
+              <a:srgbClr val="012F7B"/>
+            </a:solidFill>
+            <a:miter lim="400000"/>
+          </a:ln>
+          <a:extLst>
+            <a:ext uri="{C572A759-6A51-4108-AA02-DFA0A04FC94B}">
+              <ma14:wrappingTextBoxFlag xmlns:ma14="http://schemas.microsoft.com/office/mac/drawingml/2011/main" val="1"/>
+            </a:ext>
+          </a:extLst>
+        </p:spPr>
+        <p:txBody>
+          <a:bodyPr lIns="0" tIns="0" rIns="0" bIns="0">
+            <a:spAutoFit/>
+          </a:bodyPr>
+          <a:lstStyle>
+            <a:lvl1pPr>
+              <a:defRPr sz="2400"/>
+            </a:lvl1pPr>
+          </a:lstStyle>
+          <a:p>
+            <a:pPr/>
+            <a:r>
+              <a:t>Coding to learn: activity</a:t>
+            </a:r>
+          </a:p>
+        </p:txBody>
+      </p:sp>
+      <p:sp>
+        <p:nvSpPr>
+          <p:cNvPr id="208" name="Be sure to: do the work below in your saved copy of thenAlice’s restaurant Pyret file:…"/>
+          <p:cNvSpPr txBox="1"/>
+          <p:nvPr/>
+        </p:nvSpPr>
+        <p:spPr>
+          <a:xfrm>
+            <a:off x="1574215" y="1035377"/>
+            <a:ext cx="6340930" cy="1536503"/>
+          </a:xfrm>
+          <a:prstGeom prst="rect">
+            <a:avLst/>
+          </a:prstGeom>
+          <a:solidFill>
+            <a:srgbClr val="FFFFFF"/>
+          </a:solidFill>
+          <a:ln w="12700">
+            <a:solidFill>
+              <a:srgbClr val="0056D6"/>
+            </a:solidFill>
+            <a:miter lim="400000"/>
+          </a:ln>
+          <a:extLst>
+            <a:ext uri="{C572A759-6A51-4108-AA02-DFA0A04FC94B}">
+              <ma14:wrappingTextBoxFlag xmlns:ma14="http://schemas.microsoft.com/office/mac/drawingml/2011/main" val="1"/>
+            </a:ext>
+          </a:extLst>
+        </p:spPr>
+        <p:txBody>
+          <a:bodyPr lIns="0" tIns="0" rIns="0" bIns="0">
+            <a:spAutoFit/>
+          </a:bodyPr>
+          <a:lstStyle/>
+          <a:p>
+            <a:pPr>
+              <a:defRPr>
+                <a:solidFill>
+                  <a:schemeClr val="accent5">
+                    <a:satOff val="-3088"/>
+                    <a:lumOff val="12696"/>
+                  </a:schemeClr>
+                </a:solidFill>
+              </a:defRPr>
+            </a:pPr>
+            <a:r>
+              <a:t>Be sure to: </a:t>
+            </a:r>
+            <a:r>
+              <a:rPr>
+                <a:solidFill>
+                  <a:schemeClr val="accent1">
+                    <a:lumOff val="-6117"/>
+                  </a:schemeClr>
+                </a:solidFill>
+              </a:rPr>
+              <a:t>do the work below in your saved copy of thenAlice’s restaurant Pyret file:</a:t>
+            </a:r>
+          </a:p>
+          <a:p>
+            <a:pPr/>
+            <a:endParaRPr>
+              <a:solidFill>
+                <a:srgbClr val="012F7B"/>
+              </a:solidFill>
+            </a:endParaRPr>
+          </a:p>
+          <a:p>
+            <a:pPr marL="187157" indent="-187157">
+              <a:buSzPct val="100000"/>
+              <a:buAutoNum type="arabicPeriod" startAt="1"/>
+            </a:pPr>
+            <a:r>
+              <a:rPr>
+                <a:solidFill>
+                  <a:srgbClr val="012F7B"/>
+                </a:solidFill>
+              </a:rPr>
+              <a:t> Write the piecewise function to your left in the Pyret program. Make sure to test it out and make sure it works!</a:t>
+            </a:r>
+            <a:endParaRPr>
+              <a:solidFill>
+                <a:srgbClr val="012F7B"/>
+              </a:solidFill>
+            </a:endParaRPr>
+          </a:p>
+          <a:p>
+            <a:pPr marL="187157" indent="-187157">
+              <a:buSzPct val="100000"/>
+              <a:buAutoNum type="arabicPeriod" startAt="1"/>
+            </a:pPr>
+            <a:r>
+              <a:rPr>
+                <a:solidFill>
+                  <a:srgbClr val="012F7B"/>
+                </a:solidFill>
+              </a:rPr>
+              <a:t>Write a new </a:t>
+            </a:r>
+            <a:r>
+              <a:rPr>
+                <a:solidFill>
+                  <a:srgbClr val="FF6A00"/>
+                </a:solidFill>
+                <a:latin typeface="Courier New"/>
+                <a:ea typeface="Courier New"/>
+                <a:cs typeface="Courier New"/>
+                <a:sym typeface="Courier New"/>
+              </a:rPr>
+              <a:t>order()</a:t>
+            </a:r>
+            <a:r>
+              <a:rPr>
+                <a:solidFill>
+                  <a:srgbClr val="012F7B"/>
+                </a:solidFill>
+              </a:rPr>
+              <a:t> function that outputs an image of the food instead of a price.</a:t>
+            </a:r>
+          </a:p>
+        </p:txBody>
+      </p:sp>
+      <p:pic>
+        <p:nvPicPr>
+          <p:cNvPr id="209" name="Image" descr="Image"/>
+          <p:cNvPicPr>
+            <a:picLocks noChangeAspect="1"/>
+          </p:cNvPicPr>
+          <p:nvPr/>
+        </p:nvPicPr>
+        <p:blipFill>
+          <a:blip r:embed="rId3">
+            <a:extLst/>
+          </a:blip>
+          <a:stretch>
+            <a:fillRect/>
+          </a:stretch>
+        </p:blipFill>
+        <p:spPr>
+          <a:xfrm>
+            <a:off x="2628948" y="2731664"/>
+            <a:ext cx="3795481" cy="1796607"/>
+          </a:xfrm>
+          <a:prstGeom prst="rect">
+            <a:avLst/>
+          </a:prstGeom>
+          <a:ln w="12700">
+            <a:miter lim="400000"/>
+          </a:ln>
+        </p:spPr>
+      </p:pic>
+    </p:spTree>
+  </p:cSld>
+  <p:clrMapOvr>
+    <a:masterClrMapping/>
+  </p:clrMapOvr>
+  <p:transition xmlns:p14="http://schemas.microsoft.com/office/powerpoint/2010/main" spd="med" advClick="1"/>
+  <p:timing>
+    <p:tnLst>
+      <p:par>
+        <p:cTn id="1" nodeType="tmRoot" restart="never" dur="indefinite" fill="hold">
+          <p:childTnLst>
+            <p:seq concurrent="1" prevAc="none" nextAc="seek">
+              <p:cTn id="2" nodeType="mainSeq" dur="indefinite" fill="hold">
+                <p:childTnLst>
+                  <p:par>
+                    <p:cTn id="3" fill="hold">
+                      <p:stCondLst>
+                        <p:cond delay="indefinite"/>
+                      </p:stCondLst>
+                      <p:childTnLst>
+                        <p:par>
+                          <p:cTn id="4" fill="hold">
+                            <p:stCondLst>
+                              <p:cond delay="0"/>
+                            </p:stCondLst>
+                            <p:childTnLst>
+                              <p:par>
+                                <p:cTn id="5" presetClass="entr" nodeType="clickEffect" presetSubtype="0" presetID="1" grpId="1" fill="hold">
+                                  <p:stCondLst>
+                                    <p:cond delay="0"/>
+                                  </p:stCondLst>
+                                  <p:iterate type="el" backwards="0">
+                                    <p:tmAbs val="0"/>
+                                  </p:iterate>
+                                  <p:childTnLst>
+                                    <p:set>
+                                      <p:cBhvr>
+                                        <p:cTn id="6" fill="hold"/>
+                                        <p:tgtEl>
+                                          <p:spTgt spid="208">
+                                            <p:bg/>
+                                          </p:spTgt>
+                                        </p:tgtEl>
+                                        <p:attrNameLst>
+                                          <p:attrName>style.visibility</p:attrName>
+                                        </p:attrNameLst>
+                                      </p:cBhvr>
+                                      <p:to>
+                                        <p:strVal val="visible"/>
+                                      </p:to>
+                                    </p:set>
+                                  </p:childTnLst>
+                                </p:cTn>
+                              </p:par>
+                              <p:par>
+                                <p:cTn id="7" presetClass="entr" nodeType="withEffect" presetSubtype="0" presetID="1" grpId="1" fill="hold">
+                                  <p:stCondLst>
+                                    <p:cond delay="0"/>
+                                  </p:stCondLst>
+                                  <p:iterate type="el" backwards="0">
+                                    <p:tmAbs val="0"/>
+                                  </p:iterate>
+                                  <p:childTnLst>
+                                    <p:set>
+                                      <p:cBhvr>
+                                        <p:cTn id="8" fill="hold"/>
+                                        <p:tgtEl>
+                                          <p:spTgt spid="208">
+                                            <p:txEl>
+                                              <p:pRg st="0" end="0"/>
+                                            </p:txEl>
+                                          </p:spTgt>
+                                        </p:tgtEl>
+                                        <p:attrNameLst>
+                                          <p:attrName>style.visibility</p:attrName>
+                                        </p:attrNameLst>
+                                      </p:cBhvr>
+                                      <p:to>
+                                        <p:strVal val="visible"/>
+                                      </p:to>
+                                    </p:set>
+                                  </p:childTnLst>
+                                </p:cTn>
+                              </p:par>
+                            </p:childTnLst>
+                          </p:cTn>
+                        </p:par>
+                      </p:childTnLst>
+                    </p:cTn>
+                  </p:par>
+                  <p:par>
+                    <p:cTn id="9" fill="hold">
+                      <p:stCondLst>
+                        <p:cond delay="indefinite"/>
+                      </p:stCondLst>
+                      <p:childTnLst>
+                        <p:par>
+                          <p:cTn id="10" fill="hold">
+                            <p:stCondLst>
+                              <p:cond delay="0"/>
+                            </p:stCondLst>
+                            <p:childTnLst>
+                              <p:par>
+                                <p:cTn id="11" presetClass="entr" nodeType="clickEffect" presetSubtype="0" presetID="1" grpId="1" fill="hold">
+                                  <p:stCondLst>
+                                    <p:cond delay="0"/>
+                                  </p:stCondLst>
+                                  <p:iterate type="el" backwards="0">
+                                    <p:tmAbs val="0"/>
+                                  </p:iterate>
+                                  <p:childTnLst>
+                                    <p:set>
+                                      <p:cBhvr>
+                                        <p:cTn id="12" fill="hold"/>
+                                        <p:tgtEl>
+                                          <p:spTgt spid="208">
+                                            <p:txEl>
+                                              <p:pRg st="1" end="1"/>
+                                            </p:txEl>
+                                          </p:spTgt>
+                                        </p:tgtEl>
+                                        <p:attrNameLst>
+                                          <p:attrName>style.visibility</p:attrName>
+                                        </p:attrNameLst>
+                                      </p:cBhvr>
+                                      <p:to>
+                                        <p:strVal val="visible"/>
+                                      </p:to>
+                                    </p:set>
+                                  </p:childTnLst>
+                                </p:cTn>
+                              </p:par>
+                            </p:childTnLst>
+                          </p:cTn>
+                        </p:par>
+                      </p:childTnLst>
+                    </p:cTn>
+                  </p:par>
+                  <p:par>
+                    <p:cTn id="13" fill="hold">
+                      <p:stCondLst>
+                        <p:cond delay="indefinite"/>
+                      </p:stCondLst>
+                      <p:childTnLst>
+                        <p:par>
+                          <p:cTn id="14" fill="hold">
+                            <p:stCondLst>
+                              <p:cond delay="0"/>
+                            </p:stCondLst>
+                            <p:childTnLst>
+                              <p:par>
+                                <p:cTn id="15" presetClass="entr" nodeType="clickEffect" presetSubtype="0" presetID="1" grpId="1" fill="hold">
+                                  <p:stCondLst>
+                                    <p:cond delay="0"/>
+                                  </p:stCondLst>
+                                  <p:iterate type="el" backwards="0">
+                                    <p:tmAbs val="0"/>
+                                  </p:iterate>
+                                  <p:childTnLst>
+                                    <p:set>
+                                      <p:cBhvr>
+                                        <p:cTn id="16" fill="hold"/>
+                                        <p:tgtEl>
+                                          <p:spTgt spid="208">
                                             <p:txEl>
                                               <p:pRg st="2" end="2"/>
                                             </p:txEl>
@@ -6494,7 +7387,7 @@
                                       <p:cBhvr>
                                         <p:cTn id="20" fill="hold"/>
                                         <p:tgtEl>
-                                          <p:spTgt spid="197">
+                                          <p:spTgt spid="208">
                                             <p:txEl>
                                               <p:pRg st="3" end="3"/>
                                             </p:txEl>
@@ -6539,13 +7432,13 @@
       </p:par>
     </p:tnLst>
     <p:bldLst>
-      <p:bldP build="p" bldLvl="5" animBg="1" rev="0" advAuto="0" spid="197" grpId="1"/>
+      <p:bldP build="p" bldLvl="5" animBg="1" rev="0" advAuto="0" spid="208" grpId="1"/>
     </p:bldLst>
   </p:timing>
 </p:sld>
 </file>
 
-<file path=ppt/slides/slide5.xml><?xml version="1.0" encoding="utf-8"?>
+<file path=ppt/slides/slide7.xml><?xml version="1.0" encoding="utf-8"?>
 <p:sld xmlns:a="http://schemas.openxmlformats.org/drawingml/2006/main" xmlns:r="http://schemas.openxmlformats.org/officeDocument/2006/relationships" xmlns:p="http://schemas.openxmlformats.org/presentationml/2006/main" xmlns:m="http://schemas.openxmlformats.org/officeDocument/2006/math" xmlns:a14="http://schemas.microsoft.com/office/drawing/2010/main" showMasterSp="1" showMasterPhAnim="1">
   <p:cSld>
     <p:spTree>
@@ -6564,23 +7457,48 @@
       </p:grpSpPr>
       <p:sp>
         <p:nvSpPr>
-          <p:cNvPr id="200" name="Coding to learn: warm up"/>
+          <p:cNvPr id="213" name="Double-click to edit"/>
+          <p:cNvSpPr txBox="1"/>
+          <p:nvPr>
+            <p:ph type="title"/>
+          </p:nvPr>
+        </p:nvSpPr>
+        <p:spPr>
+          <a:prstGeom prst="rect">
+            <a:avLst/>
+          </a:prstGeom>
+        </p:spPr>
+        <p:txBody>
+          <a:bodyPr/>
+          <a:lstStyle/>
+          <a:p>
+            <a:pPr defTabSz="886968">
+              <a:defRPr sz="2910"/>
+            </a:pPr>
+          </a:p>
+        </p:txBody>
+      </p:sp>
+      <p:sp>
+        <p:nvSpPr>
+          <p:cNvPr id="214" name="Exit ticket"/>
           <p:cNvSpPr txBox="1"/>
           <p:nvPr/>
         </p:nvSpPr>
         <p:spPr>
           <a:xfrm>
-            <a:off x="2241183" y="488242"/>
-            <a:ext cx="4266992" cy="381001"/>
+            <a:off x="1404467" y="357128"/>
+            <a:ext cx="7302728" cy="939691"/>
           </a:xfrm>
           <a:prstGeom prst="rect">
             <a:avLst/>
           </a:prstGeom>
-          <a:ln w="12700">
+          <a:solidFill>
+            <a:srgbClr val="FFFFFF"/>
+          </a:solidFill>
+          <a:ln w="25400">
             <a:solidFill>
-              <a:srgbClr val="012F7B"/>
+              <a:schemeClr val="accent1"/>
             </a:solidFill>
-            <a:miter lim="400000"/>
           </a:ln>
           <a:extLst>
             <a:ext uri="{C572A759-6A51-4108-AA02-DFA0A04FC94B}">
@@ -6589,32 +7507,37 @@
           </a:extLst>
         </p:spPr>
         <p:txBody>
-          <a:bodyPr lIns="0" tIns="0" rIns="0" bIns="0">
-            <a:spAutoFit/>
+          <a:bodyPr lIns="91422" tIns="91422" rIns="91422" bIns="91422">
+            <a:normAutofit fontScale="100000" lnSpcReduction="0"/>
           </a:bodyPr>
           <a:lstStyle>
-            <a:lvl1pPr>
-              <a:defRPr sz="2400"/>
+            <a:lvl1pPr defTabSz="813816">
+              <a:defRPr sz="2100">
+                <a:latin typeface="+mn-lt"/>
+                <a:ea typeface="+mn-ea"/>
+                <a:cs typeface="+mn-cs"/>
+                <a:sym typeface="Arial"/>
+              </a:defRPr>
             </a:lvl1pPr>
           </a:lstStyle>
           <a:p>
             <a:pPr/>
             <a:r>
-              <a:t>Coding to learn: warm up</a:t>
-            </a:r>
-          </a:p>
-        </p:txBody>
-      </p:sp>
-      <p:sp>
-        <p:nvSpPr>
-          <p:cNvPr id="201" name="be sure to: take a seat at your computer, next to your partner.  Keep your binder out. Open the Alice’s Restaurant Starter File on Google Classroom.  Save a copy.  Answer the questions below in your notes.:…"/>
+              <a:t>Exit ticket</a:t>
+            </a:r>
+          </a:p>
+        </p:txBody>
+      </p:sp>
+      <p:sp>
+        <p:nvSpPr>
+          <p:cNvPr id="215" name="Be sure to: get out a sheet of loose leaf paper. Write your name and the date on top. Answer each question below with a complete sentence. Be prepared to hand in as you leave!…"/>
           <p:cNvSpPr txBox="1"/>
           <p:nvPr/>
         </p:nvSpPr>
         <p:spPr>
           <a:xfrm>
-            <a:off x="1417029" y="1236753"/>
-            <a:ext cx="5044704" cy="2159001"/>
+            <a:off x="350267" y="1656889"/>
+            <a:ext cx="7462021" cy="1511301"/>
           </a:xfrm>
           <a:prstGeom prst="rect">
             <a:avLst/>
@@ -6644,91 +7567,31 @@
             <a:r>
               <a:rPr>
                 <a:solidFill>
-                  <a:srgbClr val="FFAB01"/>
-                </a:solidFill>
-              </a:rPr>
-              <a:t>be sure to</a:t>
-            </a:r>
-            <a:r>
-              <a:t>:</a:t>
-            </a:r>
-            <a:r>
-              <a:rPr>
-                <a:solidFill>
-                  <a:schemeClr val="accent5">
-                    <a:lumOff val="-9843"/>
-                  </a:schemeClr>
-                </a:solidFill>
-              </a:rPr>
-              <a:t> </a:t>
-            </a:r>
-            <a:r>
-              <a:rPr>
-                <a:solidFill>
-                  <a:srgbClr val="11053B"/>
-                </a:solidFill>
-              </a:rPr>
-              <a:t>take a seat at your computer, next to your partner.  Keep your </a:t>
-            </a:r>
-            <a:r>
-              <a:rPr b="1">
-                <a:solidFill>
-                  <a:srgbClr val="11053B"/>
-                </a:solidFill>
-              </a:rPr>
-              <a:t>binder </a:t>
-            </a:r>
-            <a:r>
-              <a:rPr>
-                <a:solidFill>
-                  <a:srgbClr val="11053B"/>
-                </a:solidFill>
-              </a:rPr>
-              <a:t>out</a:t>
-            </a:r>
-            <a:r>
-              <a:rPr>
-                <a:solidFill>
-                  <a:srgbClr val="11053B"/>
-                </a:solidFill>
-              </a:rPr>
-              <a:t>.</a:t>
-            </a:r>
-            <a:r>
-              <a:rPr>
-                <a:solidFill>
-                  <a:schemeClr val="accent3">
-                    <a:lumOff val="-9098"/>
-                  </a:schemeClr>
-                </a:solidFill>
-              </a:rPr>
-              <a:t> </a:t>
-            </a:r>
-            <a:r>
-              <a:t>Open the </a:t>
-            </a:r>
-            <a:r>
-              <a:rPr>
-                <a:solidFill>
-                  <a:srgbClr val="E22400"/>
-                </a:solidFill>
-              </a:rPr>
-              <a:t>Alice’s Restaurant Starter File</a:t>
-            </a:r>
-            <a:r>
-              <a:t> on </a:t>
-            </a:r>
-            <a:r>
-              <a:rPr>
-                <a:solidFill>
                   <a:srgbClr val="FF6A00"/>
                 </a:solidFill>
               </a:rPr>
-              <a:t>Google Classroom</a:t>
-            </a:r>
-            <a:r>
-              <a:t>.  Save a copy.  Answer the questions below in your notes.:</a:t>
-            </a:r>
+              <a:t>Be sure to</a:t>
+            </a:r>
+            <a:r>
+              <a:rPr>
+                <a:solidFill>
+                  <a:srgbClr val="000000"/>
+                </a:solidFill>
+              </a:rPr>
+              <a:t>: get</a:t>
+            </a:r>
+            <a:r>
+              <a:t> out a sheet of loose leaf paper. Write your name and the date on top. Answer each question below with a complete sentence. Be prepared to hand in as you leave!</a:t>
+            </a:r>
+          </a:p>
+          <a:p>
+            <a:pPr>
+              <a:defRPr>
+                <a:solidFill>
+                  <a:srgbClr val="011D57"/>
+                </a:solidFill>
+              </a:defRPr>
+            </a:pPr>
           </a:p>
           <a:p>
             <a:pPr>
@@ -6750,7 +7613,7 @@
               </a:defRPr>
             </a:pPr>
             <a:r>
-              <a:t>Describe what you notice about this program.</a:t>
+              <a:t>Describe how piecewise functions work in Pyret..</a:t>
             </a:r>
           </a:p>
           <a:p>
@@ -6764,35 +7627,7 @@
               </a:defRPr>
             </a:pPr>
             <a:r>
-              <a:t>What function is being defined here?</a:t>
-            </a:r>
-          </a:p>
-          <a:p>
-            <a:pPr marL="187157" indent="-187157">
-              <a:buSzPct val="100000"/>
-              <a:buAutoNum type="arabicPeriod" startAt="1"/>
-              <a:defRPr>
-                <a:solidFill>
-                  <a:srgbClr val="011D57"/>
-                </a:solidFill>
-              </a:defRPr>
-            </a:pPr>
-            <a:r>
-              <a:t>How does the function work?</a:t>
-            </a:r>
-          </a:p>
-          <a:p>
-            <a:pPr marL="187157" indent="-187157">
-              <a:buSzPct val="100000"/>
-              <a:buAutoNum type="arabicPeriod" startAt="1"/>
-              <a:defRPr>
-                <a:solidFill>
-                  <a:srgbClr val="011D57"/>
-                </a:solidFill>
-              </a:defRPr>
-            </a:pPr>
-            <a:r>
-              <a:t>What happens when we try to order something not on the menu?</a:t>
+              <a:t>How do you think you could use piecewise functions in your video game?</a:t>
             </a:r>
           </a:p>
         </p:txBody>
@@ -6836,7 +7671,7 @@
                                       <p:cBhvr>
                                         <p:cTn id="6" fill="hold"/>
                                         <p:tgtEl>
-                                          <p:spTgt spid="201"/>
+                                          <p:spTgt spid="215"/>
                                         </p:tgtEl>
                                         <p:attrNameLst>
                                           <p:attrName>style.visibility</p:attrName>
@@ -6877,760 +7712,7 @@
       </p:par>
     </p:tnLst>
     <p:bldLst>
-      <p:bldP build="whole" bldLvl="1" animBg="1" rev="0" advAuto="0" spid="201" grpId="1"/>
-    </p:bldLst>
-  </p:timing>
-</p:sld>
-</file>
-
-<file path=ppt/slides/slide6.xml><?xml version="1.0" encoding="utf-8"?>
-<p:sld xmlns:a="http://schemas.openxmlformats.org/drawingml/2006/main" xmlns:r="http://schemas.openxmlformats.org/officeDocument/2006/relationships" xmlns:p="http://schemas.openxmlformats.org/presentationml/2006/main" xmlns:m="http://schemas.openxmlformats.org/officeDocument/2006/math" xmlns:a14="http://schemas.microsoft.com/office/drawing/2010/main" showMasterSp="1" showMasterPhAnim="1">
-  <p:cSld>
-    <p:spTree>
-      <p:nvGrpSpPr>
-        <p:cNvPr id="1" name=""/>
-        <p:cNvGrpSpPr/>
-        <p:nvPr/>
-      </p:nvGrpSpPr>
-      <p:grpSpPr>
-        <a:xfrm>
-          <a:off x="0" y="0"/>
-          <a:ext cx="0" cy="0"/>
-          <a:chOff x="0" y="0"/>
-          <a:chExt cx="0" cy="0"/>
-        </a:xfrm>
-      </p:grpSpPr>
-      <p:sp>
-        <p:nvSpPr>
-          <p:cNvPr id="205" name="Coding to learn: activity"/>
-          <p:cNvSpPr txBox="1"/>
-          <p:nvPr/>
-        </p:nvSpPr>
-        <p:spPr>
-          <a:xfrm>
-            <a:off x="2241183" y="488242"/>
-            <a:ext cx="3396395" cy="381001"/>
-          </a:xfrm>
-          <a:prstGeom prst="rect">
-            <a:avLst/>
-          </a:prstGeom>
-          <a:ln w="12700">
-            <a:solidFill>
-              <a:srgbClr val="012F7B"/>
-            </a:solidFill>
-            <a:miter lim="400000"/>
-          </a:ln>
-          <a:extLst>
-            <a:ext uri="{C572A759-6A51-4108-AA02-DFA0A04FC94B}">
-              <ma14:wrappingTextBoxFlag xmlns:ma14="http://schemas.microsoft.com/office/mac/drawingml/2011/main" val="1"/>
-            </a:ext>
-          </a:extLst>
-        </p:spPr>
-        <p:txBody>
-          <a:bodyPr lIns="0" tIns="0" rIns="0" bIns="0">
-            <a:spAutoFit/>
-          </a:bodyPr>
-          <a:lstStyle>
-            <a:lvl1pPr>
-              <a:defRPr sz="2400"/>
-            </a:lvl1pPr>
-          </a:lstStyle>
-          <a:p>
-            <a:pPr/>
-            <a:r>
-              <a:t>Coding to learn: activity</a:t>
-            </a:r>
-          </a:p>
-        </p:txBody>
-      </p:sp>
-      <p:sp>
-        <p:nvSpPr>
-          <p:cNvPr id="206" name="Be sure to: do the work below in your saved copy of thenAlice’s restaurant Pyret file:…"/>
-          <p:cNvSpPr txBox="1"/>
-          <p:nvPr/>
-        </p:nvSpPr>
-        <p:spPr>
-          <a:xfrm>
-            <a:off x="1574215" y="1035377"/>
-            <a:ext cx="6340930" cy="1536503"/>
-          </a:xfrm>
-          <a:prstGeom prst="rect">
-            <a:avLst/>
-          </a:prstGeom>
-          <a:solidFill>
-            <a:srgbClr val="FFFFFF"/>
-          </a:solidFill>
-          <a:ln w="12700">
-            <a:solidFill>
-              <a:srgbClr val="0056D6"/>
-            </a:solidFill>
-            <a:miter lim="400000"/>
-          </a:ln>
-          <a:extLst>
-            <a:ext uri="{C572A759-6A51-4108-AA02-DFA0A04FC94B}">
-              <ma14:wrappingTextBoxFlag xmlns:ma14="http://schemas.microsoft.com/office/mac/drawingml/2011/main" val="1"/>
-            </a:ext>
-          </a:extLst>
-        </p:spPr>
-        <p:txBody>
-          <a:bodyPr lIns="0" tIns="0" rIns="0" bIns="0">
-            <a:spAutoFit/>
-          </a:bodyPr>
-          <a:lstStyle/>
-          <a:p>
-            <a:pPr>
-              <a:defRPr>
-                <a:solidFill>
-                  <a:schemeClr val="accent5">
-                    <a:satOff val="-3088"/>
-                    <a:lumOff val="12696"/>
-                  </a:schemeClr>
-                </a:solidFill>
-              </a:defRPr>
-            </a:pPr>
-            <a:r>
-              <a:t>Be sure to: </a:t>
-            </a:r>
-            <a:r>
-              <a:rPr>
-                <a:solidFill>
-                  <a:schemeClr val="accent1">
-                    <a:lumOff val="-6117"/>
-                  </a:schemeClr>
-                </a:solidFill>
-              </a:rPr>
-              <a:t>do the work below in your saved copy of thenAlice’s restaurant Pyret file:</a:t>
-            </a:r>
-          </a:p>
-          <a:p>
-            <a:pPr/>
-            <a:endParaRPr>
-              <a:solidFill>
-                <a:srgbClr val="012F7B"/>
-              </a:solidFill>
-            </a:endParaRPr>
-          </a:p>
-          <a:p>
-            <a:pPr marL="187157" indent="-187157">
-              <a:buSzPct val="100000"/>
-              <a:buAutoNum type="arabicPeriod" startAt="1"/>
-            </a:pPr>
-            <a:r>
-              <a:rPr>
-                <a:solidFill>
-                  <a:srgbClr val="012F7B"/>
-                </a:solidFill>
-              </a:rPr>
-              <a:t> Write the piecewise function to your left in the Pyret program. Make sure to test it out and make sure it works!</a:t>
-            </a:r>
-            <a:endParaRPr>
-              <a:solidFill>
-                <a:srgbClr val="012F7B"/>
-              </a:solidFill>
-            </a:endParaRPr>
-          </a:p>
-          <a:p>
-            <a:pPr marL="187157" indent="-187157">
-              <a:buSzPct val="100000"/>
-              <a:buAutoNum type="arabicPeriod" startAt="1"/>
-            </a:pPr>
-            <a:r>
-              <a:rPr>
-                <a:solidFill>
-                  <a:srgbClr val="012F7B"/>
-                </a:solidFill>
-              </a:rPr>
-              <a:t>Write a new </a:t>
-            </a:r>
-            <a:r>
-              <a:rPr>
-                <a:solidFill>
-                  <a:srgbClr val="FF6A00"/>
-                </a:solidFill>
-                <a:latin typeface="Courier New"/>
-                <a:ea typeface="Courier New"/>
-                <a:cs typeface="Courier New"/>
-                <a:sym typeface="Courier New"/>
-              </a:rPr>
-              <a:t>order()</a:t>
-            </a:r>
-            <a:r>
-              <a:rPr>
-                <a:solidFill>
-                  <a:srgbClr val="012F7B"/>
-                </a:solidFill>
-              </a:rPr>
-              <a:t> function that outputs an image of the food instead of a price.</a:t>
-            </a:r>
-          </a:p>
-        </p:txBody>
-      </p:sp>
-      <p:pic>
-        <p:nvPicPr>
-          <p:cNvPr id="207" name="Image" descr="Image"/>
-          <p:cNvPicPr>
-            <a:picLocks noChangeAspect="1"/>
-          </p:cNvPicPr>
-          <p:nvPr/>
-        </p:nvPicPr>
-        <p:blipFill>
-          <a:blip r:embed="rId3">
-            <a:extLst/>
-          </a:blip>
-          <a:stretch>
-            <a:fillRect/>
-          </a:stretch>
-        </p:blipFill>
-        <p:spPr>
-          <a:xfrm>
-            <a:off x="2628948" y="2731664"/>
-            <a:ext cx="3795481" cy="1796607"/>
-          </a:xfrm>
-          <a:prstGeom prst="rect">
-            <a:avLst/>
-          </a:prstGeom>
-          <a:ln w="12700">
-            <a:miter lim="400000"/>
-          </a:ln>
-        </p:spPr>
-      </p:pic>
-    </p:spTree>
-  </p:cSld>
-  <p:clrMapOvr>
-    <a:masterClrMapping/>
-  </p:clrMapOvr>
-  <p:transition xmlns:p14="http://schemas.microsoft.com/office/powerpoint/2010/main" spd="med" advClick="1"/>
-  <p:timing>
-    <p:tnLst>
-      <p:par>
-        <p:cTn id="1" nodeType="tmRoot" restart="never" dur="indefinite" fill="hold">
-          <p:childTnLst>
-            <p:seq concurrent="1" prevAc="none" nextAc="seek">
-              <p:cTn id="2" nodeType="mainSeq" dur="indefinite" fill="hold">
-                <p:childTnLst>
-                  <p:par>
-                    <p:cTn id="3" fill="hold">
-                      <p:stCondLst>
-                        <p:cond delay="indefinite"/>
-                      </p:stCondLst>
-                      <p:childTnLst>
-                        <p:par>
-                          <p:cTn id="4" fill="hold">
-                            <p:stCondLst>
-                              <p:cond delay="0"/>
-                            </p:stCondLst>
-                            <p:childTnLst>
-                              <p:par>
-                                <p:cTn id="5" presetClass="entr" nodeType="clickEffect" presetSubtype="0" presetID="1" grpId="1" fill="hold">
-                                  <p:stCondLst>
-                                    <p:cond delay="0"/>
-                                  </p:stCondLst>
-                                  <p:iterate type="el" backwards="0">
-                                    <p:tmAbs val="0"/>
-                                  </p:iterate>
-                                  <p:childTnLst>
-                                    <p:set>
-                                      <p:cBhvr>
-                                        <p:cTn id="6" fill="hold"/>
-                                        <p:tgtEl>
-                                          <p:spTgt spid="206">
-                                            <p:bg/>
-                                          </p:spTgt>
-                                        </p:tgtEl>
-                                        <p:attrNameLst>
-                                          <p:attrName>style.visibility</p:attrName>
-                                        </p:attrNameLst>
-                                      </p:cBhvr>
-                                      <p:to>
-                                        <p:strVal val="visible"/>
-                                      </p:to>
-                                    </p:set>
-                                  </p:childTnLst>
-                                </p:cTn>
-                              </p:par>
-                              <p:par>
-                                <p:cTn id="7" presetClass="entr" nodeType="withEffect" presetSubtype="0" presetID="1" grpId="1" fill="hold">
-                                  <p:stCondLst>
-                                    <p:cond delay="0"/>
-                                  </p:stCondLst>
-                                  <p:iterate type="el" backwards="0">
-                                    <p:tmAbs val="0"/>
-                                  </p:iterate>
-                                  <p:childTnLst>
-                                    <p:set>
-                                      <p:cBhvr>
-                                        <p:cTn id="8" fill="hold"/>
-                                        <p:tgtEl>
-                                          <p:spTgt spid="206">
-                                            <p:txEl>
-                                              <p:pRg st="0" end="0"/>
-                                            </p:txEl>
-                                          </p:spTgt>
-                                        </p:tgtEl>
-                                        <p:attrNameLst>
-                                          <p:attrName>style.visibility</p:attrName>
-                                        </p:attrNameLst>
-                                      </p:cBhvr>
-                                      <p:to>
-                                        <p:strVal val="visible"/>
-                                      </p:to>
-                                    </p:set>
-                                  </p:childTnLst>
-                                </p:cTn>
-                              </p:par>
-                            </p:childTnLst>
-                          </p:cTn>
-                        </p:par>
-                      </p:childTnLst>
-                    </p:cTn>
-                  </p:par>
-                  <p:par>
-                    <p:cTn id="9" fill="hold">
-                      <p:stCondLst>
-                        <p:cond delay="indefinite"/>
-                      </p:stCondLst>
-                      <p:childTnLst>
-                        <p:par>
-                          <p:cTn id="10" fill="hold">
-                            <p:stCondLst>
-                              <p:cond delay="0"/>
-                            </p:stCondLst>
-                            <p:childTnLst>
-                              <p:par>
-                                <p:cTn id="11" presetClass="entr" nodeType="clickEffect" presetSubtype="0" presetID="1" grpId="1" fill="hold">
-                                  <p:stCondLst>
-                                    <p:cond delay="0"/>
-                                  </p:stCondLst>
-                                  <p:iterate type="el" backwards="0">
-                                    <p:tmAbs val="0"/>
-                                  </p:iterate>
-                                  <p:childTnLst>
-                                    <p:set>
-                                      <p:cBhvr>
-                                        <p:cTn id="12" fill="hold"/>
-                                        <p:tgtEl>
-                                          <p:spTgt spid="206">
-                                            <p:txEl>
-                                              <p:pRg st="1" end="1"/>
-                                            </p:txEl>
-                                          </p:spTgt>
-                                        </p:tgtEl>
-                                        <p:attrNameLst>
-                                          <p:attrName>style.visibility</p:attrName>
-                                        </p:attrNameLst>
-                                      </p:cBhvr>
-                                      <p:to>
-                                        <p:strVal val="visible"/>
-                                      </p:to>
-                                    </p:set>
-                                  </p:childTnLst>
-                                </p:cTn>
-                              </p:par>
-                            </p:childTnLst>
-                          </p:cTn>
-                        </p:par>
-                      </p:childTnLst>
-                    </p:cTn>
-                  </p:par>
-                  <p:par>
-                    <p:cTn id="13" fill="hold">
-                      <p:stCondLst>
-                        <p:cond delay="indefinite"/>
-                      </p:stCondLst>
-                      <p:childTnLst>
-                        <p:par>
-                          <p:cTn id="14" fill="hold">
-                            <p:stCondLst>
-                              <p:cond delay="0"/>
-                            </p:stCondLst>
-                            <p:childTnLst>
-                              <p:par>
-                                <p:cTn id="15" presetClass="entr" nodeType="clickEffect" presetSubtype="0" presetID="1" grpId="1" fill="hold">
-                                  <p:stCondLst>
-                                    <p:cond delay="0"/>
-                                  </p:stCondLst>
-                                  <p:iterate type="el" backwards="0">
-                                    <p:tmAbs val="0"/>
-                                  </p:iterate>
-                                  <p:childTnLst>
-                                    <p:set>
-                                      <p:cBhvr>
-                                        <p:cTn id="16" fill="hold"/>
-                                        <p:tgtEl>
-                                          <p:spTgt spid="206">
-                                            <p:txEl>
-                                              <p:pRg st="2" end="2"/>
-                                            </p:txEl>
-                                          </p:spTgt>
-                                        </p:tgtEl>
-                                        <p:attrNameLst>
-                                          <p:attrName>style.visibility</p:attrName>
-                                        </p:attrNameLst>
-                                      </p:cBhvr>
-                                      <p:to>
-                                        <p:strVal val="visible"/>
-                                      </p:to>
-                                    </p:set>
-                                  </p:childTnLst>
-                                </p:cTn>
-                              </p:par>
-                            </p:childTnLst>
-                          </p:cTn>
-                        </p:par>
-                      </p:childTnLst>
-                    </p:cTn>
-                  </p:par>
-                  <p:par>
-                    <p:cTn id="17" fill="hold">
-                      <p:stCondLst>
-                        <p:cond delay="indefinite"/>
-                      </p:stCondLst>
-                      <p:childTnLst>
-                        <p:par>
-                          <p:cTn id="18" fill="hold">
-                            <p:stCondLst>
-                              <p:cond delay="0"/>
-                            </p:stCondLst>
-                            <p:childTnLst>
-                              <p:par>
-                                <p:cTn id="19" presetClass="entr" nodeType="clickEffect" presetSubtype="0" presetID="1" grpId="1" fill="hold">
-                                  <p:stCondLst>
-                                    <p:cond delay="0"/>
-                                  </p:stCondLst>
-                                  <p:iterate type="el" backwards="0">
-                                    <p:tmAbs val="0"/>
-                                  </p:iterate>
-                                  <p:childTnLst>
-                                    <p:set>
-                                      <p:cBhvr>
-                                        <p:cTn id="20" fill="hold"/>
-                                        <p:tgtEl>
-                                          <p:spTgt spid="206">
-                                            <p:txEl>
-                                              <p:pRg st="3" end="3"/>
-                                            </p:txEl>
-                                          </p:spTgt>
-                                        </p:tgtEl>
-                                        <p:attrNameLst>
-                                          <p:attrName>style.visibility</p:attrName>
-                                        </p:attrNameLst>
-                                      </p:cBhvr>
-                                      <p:to>
-                                        <p:strVal val="visible"/>
-                                      </p:to>
-                                    </p:set>
-                                  </p:childTnLst>
-                                </p:cTn>
-                              </p:par>
-                            </p:childTnLst>
-                          </p:cTn>
-                        </p:par>
-                      </p:childTnLst>
-                    </p:cTn>
-                  </p:par>
-                </p:childTnLst>
-              </p:cTn>
-              <p:prevCondLst>
-                <p:cond evt="onPrev">
-                  <p:tgtEl>
-                    <p:sldTgt/>
-                  </p:tgtEl>
-                </p:cond>
-              </p:prevCondLst>
-              <p:nextCondLst>
-                <p:cond evt="onNext">
-                  <p:tgtEl>
-                    <p:sldTgt/>
-                  </p:tgtEl>
-                </p:cond>
-              </p:nextCondLst>
-            </p:seq>
-          </p:childTnLst>
-        </p:cTn>
-      </p:par>
-    </p:tnLst>
-    <p:bldLst>
-      <p:bldP build="p" bldLvl="5" animBg="1" rev="0" advAuto="0" spid="206" grpId="1"/>
-    </p:bldLst>
-  </p:timing>
-</p:sld>
-</file>
-
-<file path=ppt/slides/slide7.xml><?xml version="1.0" encoding="utf-8"?>
-<p:sld xmlns:a="http://schemas.openxmlformats.org/drawingml/2006/main" xmlns:r="http://schemas.openxmlformats.org/officeDocument/2006/relationships" xmlns:p="http://schemas.openxmlformats.org/presentationml/2006/main" xmlns:m="http://schemas.openxmlformats.org/officeDocument/2006/math" xmlns:a14="http://schemas.microsoft.com/office/drawing/2010/main" showMasterSp="1" showMasterPhAnim="1">
-  <p:cSld>
-    <p:spTree>
-      <p:nvGrpSpPr>
-        <p:cNvPr id="1" name=""/>
-        <p:cNvGrpSpPr/>
-        <p:nvPr/>
-      </p:nvGrpSpPr>
-      <p:grpSpPr>
-        <a:xfrm>
-          <a:off x="0" y="0"/>
-          <a:ext cx="0" cy="0"/>
-          <a:chOff x="0" y="0"/>
-          <a:chExt cx="0" cy="0"/>
-        </a:xfrm>
-      </p:grpSpPr>
-      <p:sp>
-        <p:nvSpPr>
-          <p:cNvPr id="211" name="Double-click to edit"/>
-          <p:cNvSpPr txBox="1"/>
-          <p:nvPr>
-            <p:ph type="title"/>
-          </p:nvPr>
-        </p:nvSpPr>
-        <p:spPr>
-          <a:prstGeom prst="rect">
-            <a:avLst/>
-          </a:prstGeom>
-        </p:spPr>
-        <p:txBody>
-          <a:bodyPr/>
-          <a:lstStyle/>
-          <a:p>
-            <a:pPr defTabSz="886968">
-              <a:defRPr sz="2910"/>
-            </a:pPr>
-          </a:p>
-        </p:txBody>
-      </p:sp>
-      <p:sp>
-        <p:nvSpPr>
-          <p:cNvPr id="212" name="Exit ticket"/>
-          <p:cNvSpPr txBox="1"/>
-          <p:nvPr/>
-        </p:nvSpPr>
-        <p:spPr>
-          <a:xfrm>
-            <a:off x="1404467" y="357128"/>
-            <a:ext cx="7302728" cy="939691"/>
-          </a:xfrm>
-          <a:prstGeom prst="rect">
-            <a:avLst/>
-          </a:prstGeom>
-          <a:solidFill>
-            <a:srgbClr val="FFFFFF"/>
-          </a:solidFill>
-          <a:ln w="25400">
-            <a:solidFill>
-              <a:schemeClr val="accent1"/>
-            </a:solidFill>
-          </a:ln>
-          <a:extLst>
-            <a:ext uri="{C572A759-6A51-4108-AA02-DFA0A04FC94B}">
-              <ma14:wrappingTextBoxFlag xmlns:ma14="http://schemas.microsoft.com/office/mac/drawingml/2011/main" val="1"/>
-            </a:ext>
-          </a:extLst>
-        </p:spPr>
-        <p:txBody>
-          <a:bodyPr lIns="91422" tIns="91422" rIns="91422" bIns="91422">
-            <a:normAutofit fontScale="100000" lnSpcReduction="0"/>
-          </a:bodyPr>
-          <a:lstStyle>
-            <a:lvl1pPr defTabSz="813816">
-              <a:defRPr sz="2100">
-                <a:latin typeface="+mn-lt"/>
-                <a:ea typeface="+mn-ea"/>
-                <a:cs typeface="+mn-cs"/>
-                <a:sym typeface="Arial"/>
-              </a:defRPr>
-            </a:lvl1pPr>
-          </a:lstStyle>
-          <a:p>
-            <a:pPr/>
-            <a:r>
-              <a:t>Exit ticket</a:t>
-            </a:r>
-          </a:p>
-        </p:txBody>
-      </p:sp>
-      <p:sp>
-        <p:nvSpPr>
-          <p:cNvPr id="213" name="Be sure to: get out a sheet of loose leaf paper. Write your name and the date on top. Answer each question below with a complete sentence. Be prepared to hand in as you leave!…"/>
-          <p:cNvSpPr txBox="1"/>
-          <p:nvPr/>
-        </p:nvSpPr>
-        <p:spPr>
-          <a:xfrm>
-            <a:off x="350267" y="1656889"/>
-            <a:ext cx="7462021" cy="1511301"/>
-          </a:xfrm>
-          <a:prstGeom prst="rect">
-            <a:avLst/>
-          </a:prstGeom>
-          <a:ln w="12700">
-            <a:miter lim="400000"/>
-          </a:ln>
-          <a:extLst>
-            <a:ext uri="{C572A759-6A51-4108-AA02-DFA0A04FC94B}">
-              <ma14:wrappingTextBoxFlag xmlns:ma14="http://schemas.microsoft.com/office/mac/drawingml/2011/main" val="1"/>
-            </a:ext>
-          </a:extLst>
-        </p:spPr>
-        <p:txBody>
-          <a:bodyPr lIns="0" tIns="0" rIns="0" bIns="0">
-            <a:spAutoFit/>
-          </a:bodyPr>
-          <a:lstStyle/>
-          <a:p>
-            <a:pPr>
-              <a:defRPr>
-                <a:solidFill>
-                  <a:srgbClr val="011D57"/>
-                </a:solidFill>
-              </a:defRPr>
-            </a:pPr>
-            <a:r>
-              <a:rPr>
-                <a:solidFill>
-                  <a:srgbClr val="FF6A00"/>
-                </a:solidFill>
-              </a:rPr>
-              <a:t>Be sure to</a:t>
-            </a:r>
-            <a:r>
-              <a:rPr>
-                <a:solidFill>
-                  <a:srgbClr val="000000"/>
-                </a:solidFill>
-              </a:rPr>
-              <a:t>: get</a:t>
-            </a:r>
-            <a:r>
-              <a:t> out a sheet of loose leaf paper. Write your name and the date on top. Answer each question below with a complete sentence. Be prepared to hand in as you leave!</a:t>
-            </a:r>
-          </a:p>
-          <a:p>
-            <a:pPr>
-              <a:defRPr>
-                <a:solidFill>
-                  <a:srgbClr val="011D57"/>
-                </a:solidFill>
-              </a:defRPr>
-            </a:pPr>
-          </a:p>
-          <a:p>
-            <a:pPr>
-              <a:defRPr>
-                <a:solidFill>
-                  <a:srgbClr val="011D57"/>
-                </a:solidFill>
-              </a:defRPr>
-            </a:pPr>
-          </a:p>
-          <a:p>
-            <a:pPr marL="187157" indent="-187157">
-              <a:buSzPct val="100000"/>
-              <a:buAutoNum type="arabicPeriod" startAt="1"/>
-              <a:defRPr>
-                <a:solidFill>
-                  <a:srgbClr val="011D57"/>
-                </a:solidFill>
-              </a:defRPr>
-            </a:pPr>
-            <a:r>
-              <a:t>Describe how piecewise functions work in Pyret..</a:t>
-            </a:r>
-          </a:p>
-          <a:p>
-            <a:pPr marL="187157" indent="-187157">
-              <a:buSzPct val="100000"/>
-              <a:buAutoNum type="arabicPeriod" startAt="1"/>
-              <a:defRPr>
-                <a:solidFill>
-                  <a:srgbClr val="011D57"/>
-                </a:solidFill>
-              </a:defRPr>
-            </a:pPr>
-            <a:r>
-              <a:t>How do you think you could use piecewise functions in your video game?</a:t>
-            </a:r>
-          </a:p>
-        </p:txBody>
-      </p:sp>
-    </p:spTree>
-  </p:cSld>
-  <p:clrMapOvr>
-    <a:masterClrMapping/>
-  </p:clrMapOvr>
-  <p:transition xmlns:p14="http://schemas.microsoft.com/office/powerpoint/2010/main" spd="med" advClick="1"/>
-  <p:timing>
-    <p:tnLst>
-      <p:par>
-        <p:cTn id="1" nodeType="tmRoot" restart="never" dur="indefinite" fill="hold">
-          <p:childTnLst>
-            <p:seq concurrent="1" prevAc="none" nextAc="seek">
-              <p:cTn id="2" nodeType="mainSeq" dur="indefinite" fill="hold">
-                <p:childTnLst>
-                  <p:par>
-                    <p:cTn id="3" fill="hold">
-                      <p:stCondLst>
-                        <p:cond delay="indefinite"/>
-                      </p:stCondLst>
-                      <p:childTnLst>
-                        <p:par>
-                          <p:cTn id="4" fill="hold">
-                            <p:stCondLst>
-                              <p:cond delay="0"/>
-                            </p:stCondLst>
-                            <p:childTnLst>
-                              <p:par>
-                                <p:cTn id="5" presetClass="entr" nodeType="clickEffect" presetSubtype="0" presetID="1" grpId="1" fill="hold">
-                                  <p:stCondLst>
-                                    <p:cond delay="0"/>
-                                  </p:stCondLst>
-                                  <p:iterate type="el" backwards="0">
-                                    <p:tmAbs val="0"/>
-                                  </p:iterate>
-                                  <p:childTnLst>
-                                    <p:set>
-                                      <p:cBhvr>
-                                        <p:cTn id="6" fill="hold"/>
-                                        <p:tgtEl>
-                                          <p:spTgt spid="213"/>
-                                        </p:tgtEl>
-                                        <p:attrNameLst>
-                                          <p:attrName>style.visibility</p:attrName>
-                                        </p:attrNameLst>
-                                      </p:cBhvr>
-                                      <p:to>
-                                        <p:strVal val="visible"/>
-                                      </p:to>
-                                    </p:set>
-                                  </p:childTnLst>
-                                </p:cTn>
-                              </p:par>
-                            </p:childTnLst>
-                          </p:cTn>
-                        </p:par>
-                      </p:childTnLst>
-                    </p:cTn>
-                  </p:par>
-                </p:childTnLst>
-              </p:cTn>
-              <p:prevCondLst>
-                <p:cond evt="onPrev">
-                  <p:tgtEl>
-                    <p:sldTgt/>
-                  </p:tgtEl>
-                </p:cond>
-              </p:prevCondLst>
-              <p:nextCondLst>
-                <p:cond evt="onNext">
-                  <p:tgtEl>
-                    <p:sldTgt/>
-                  </p:tgtEl>
-                </p:cond>
-              </p:nextCondLst>
-            </p:seq>
-          </p:childTnLst>
-        </p:cTn>
-      </p:par>
-    </p:tnLst>
-    <p:bldLst>
-      <p:bldP build="whole" bldLvl="1" animBg="1" rev="0" advAuto="0" spid="213" grpId="1"/>
+      <p:bldP build="whole" bldLvl="1" animBg="1" rev="0" advAuto="0" spid="215" grpId="1"/>
     </p:bldLst>
   </p:timing>
 </p:sld>

</xml_diff>